<commit_message>
update to presentation and report
</commit_message>
<xml_diff>
--- a/deliverables/presentation.pptx
+++ b/deliverables/presentation.pptx
@@ -200,7 +200,7 @@
           <a:p>
             <a:fld id="{1EBEDD12-BCD5-485B-BCBC-34BB01D7923C}" type="datetimeFigureOut">
               <a:rPr lang="en-US" smtClean="0"/>
-              <a:t>8/26/2025</a:t>
+              <a:t>8/27/2025</a:t>
             </a:fld>
             <a:endParaRPr lang="en-US" dirty="0"/>
           </a:p>
@@ -414,7 +414,7 @@
           <a:p>
             <a:fld id="{6EE7A52F-9D89-7442-A8E9-48D1527B5F6B}" type="datetimeFigureOut">
               <a:rPr lang="en-US" smtClean="0"/>
-              <a:t>8/26/2025</a:t>
+              <a:t>8/27/2025</a:t>
             </a:fld>
             <a:endParaRPr lang="en-US" dirty="0"/>
           </a:p>
@@ -9480,41 +9480,6 @@
           </a:p>
         </p:txBody>
       </p:sp>
-      <p:pic>
-        <p:nvPicPr>
-          <p:cNvPr id="12" name="Content Placeholder 11" descr="A drawing of a long rectangular object&#10;&#10;AI-generated content may be incorrect.">
-            <a:extLst>
-              <a:ext uri="{FF2B5EF4-FFF2-40B4-BE49-F238E27FC236}">
-                <a16:creationId xmlns:a16="http://schemas.microsoft.com/office/drawing/2014/main" id="{6AF017F2-DBDB-B808-0B37-F032074E1857}"/>
-              </a:ext>
-            </a:extLst>
-          </p:cNvPr>
-          <p:cNvPicPr>
-            <a:picLocks noGrp="1" noChangeAspect="1"/>
-          </p:cNvPicPr>
-          <p:nvPr>
-            <p:ph sz="quarter" idx="16"/>
-          </p:nvPr>
-        </p:nvPicPr>
-        <p:blipFill>
-          <a:blip r:embed="rId2">
-            <a:extLst>
-              <a:ext uri="{28A0092B-C50C-407E-A947-70E740481C1C}">
-                <a14:useLocalDpi xmlns:a14="http://schemas.microsoft.com/office/drawing/2010/main" val="0"/>
-              </a:ext>
-            </a:extLst>
-          </a:blip>
-          <a:stretch>
-            <a:fillRect/>
-          </a:stretch>
-        </p:blipFill>
-        <p:spPr>
-          <a:xfrm>
-            <a:off x="7106815" y="1653608"/>
-            <a:ext cx="2562053" cy="4926263"/>
-          </a:xfrm>
-        </p:spPr>
-      </p:pic>
       <p:sp>
         <p:nvSpPr>
           <p:cNvPr id="10" name="Content Placeholder 9">
@@ -9596,6 +9561,41 @@
           </a:p>
         </p:txBody>
       </p:sp>
+      <p:pic>
+        <p:nvPicPr>
+          <p:cNvPr id="6" name="Content Placeholder 5" descr="A drawing of a long rectangular object&#10;&#10;AI-generated content may be incorrect.">
+            <a:extLst>
+              <a:ext uri="{FF2B5EF4-FFF2-40B4-BE49-F238E27FC236}">
+                <a16:creationId xmlns:a16="http://schemas.microsoft.com/office/drawing/2014/main" id="{07C0D8DE-0BA3-A971-B90B-FF872041E044}"/>
+              </a:ext>
+            </a:extLst>
+          </p:cNvPr>
+          <p:cNvPicPr>
+            <a:picLocks noGrp="1" noChangeAspect="1"/>
+          </p:cNvPicPr>
+          <p:nvPr>
+            <p:ph sz="quarter" idx="16"/>
+          </p:nvPr>
+        </p:nvPicPr>
+        <p:blipFill>
+          <a:blip r:embed="rId2">
+            <a:extLst>
+              <a:ext uri="{28A0092B-C50C-407E-A947-70E740481C1C}">
+                <a14:useLocalDpi xmlns:a14="http://schemas.microsoft.com/office/drawing/2010/main" val="0"/>
+              </a:ext>
+            </a:extLst>
+          </a:blip>
+          <a:stretch>
+            <a:fillRect/>
+          </a:stretch>
+        </p:blipFill>
+        <p:spPr>
+          <a:xfrm>
+            <a:off x="6817682" y="1199246"/>
+            <a:ext cx="3413900" cy="5538683"/>
+          </a:xfrm>
+        </p:spPr>
+      </p:pic>
     </p:spTree>
     <p:extLst>
       <p:ext uri="{BB962C8B-B14F-4D97-AF65-F5344CB8AC3E}">
@@ -10415,8 +10415,13 @@
             </a:pPr>
             <a:r>
               <a:rPr lang="en-US" dirty="0"/>
-              <a:t>Camera calibration and geometric transformations</a:t>
-            </a:r>
+              <a:t>Camera calibration and </a:t>
+            </a:r>
+            <a:r>
+              <a:rPr lang="en-US"/>
+              <a:t>geometric calculations</a:t>
+            </a:r>
+            <a:endParaRPr lang="en-US" dirty="0"/>
           </a:p>
           <a:p>
             <a:r>
@@ -11724,41 +11729,6 @@
           </a:p>
         </p:txBody>
       </p:sp>
-      <p:pic>
-        <p:nvPicPr>
-          <p:cNvPr id="6" name="Content Placeholder 5" descr="A screenshot of a graph&#10;&#10;AI-generated content may be incorrect.">
-            <a:extLst>
-              <a:ext uri="{FF2B5EF4-FFF2-40B4-BE49-F238E27FC236}">
-                <a16:creationId xmlns:a16="http://schemas.microsoft.com/office/drawing/2014/main" id="{91841047-0E3B-668B-F594-53F0BC118DFC}"/>
-              </a:ext>
-            </a:extLst>
-          </p:cNvPr>
-          <p:cNvPicPr>
-            <a:picLocks noGrp="1" noChangeAspect="1"/>
-          </p:cNvPicPr>
-          <p:nvPr>
-            <p:ph sz="quarter" idx="15"/>
-          </p:nvPr>
-        </p:nvPicPr>
-        <p:blipFill>
-          <a:blip r:embed="rId2">
-            <a:extLst>
-              <a:ext uri="{28A0092B-C50C-407E-A947-70E740481C1C}">
-                <a14:useLocalDpi xmlns:a14="http://schemas.microsoft.com/office/drawing/2010/main" val="0"/>
-              </a:ext>
-            </a:extLst>
-          </a:blip>
-          <a:stretch>
-            <a:fillRect/>
-          </a:stretch>
-        </p:blipFill>
-        <p:spPr>
-          <a:xfrm>
-            <a:off x="1460269" y="2597727"/>
-            <a:ext cx="3296852" cy="3975217"/>
-          </a:xfrm>
-        </p:spPr>
-      </p:pic>
       <p:sp>
         <p:nvSpPr>
           <p:cNvPr id="4" name="Content Placeholder 3">
@@ -11810,6 +11780,41 @@
           </a:p>
         </p:txBody>
       </p:sp>
+      <p:pic>
+        <p:nvPicPr>
+          <p:cNvPr id="8" name="Content Placeholder 7" descr="A graph of a line&#10;&#10;AI-generated content may be incorrect.">
+            <a:extLst>
+              <a:ext uri="{FF2B5EF4-FFF2-40B4-BE49-F238E27FC236}">
+                <a16:creationId xmlns:a16="http://schemas.microsoft.com/office/drawing/2014/main" id="{52479A41-AE19-63C6-03BF-05220613EEA9}"/>
+              </a:ext>
+            </a:extLst>
+          </p:cNvPr>
+          <p:cNvPicPr>
+            <a:picLocks noGrp="1" noChangeAspect="1"/>
+          </p:cNvPicPr>
+          <p:nvPr>
+            <p:ph sz="quarter" idx="15"/>
+          </p:nvPr>
+        </p:nvPicPr>
+        <p:blipFill>
+          <a:blip r:embed="rId2">
+            <a:extLst>
+              <a:ext uri="{28A0092B-C50C-407E-A947-70E740481C1C}">
+                <a14:useLocalDpi xmlns:a14="http://schemas.microsoft.com/office/drawing/2010/main" val="0"/>
+              </a:ext>
+            </a:extLst>
+          </a:blip>
+          <a:stretch>
+            <a:fillRect/>
+          </a:stretch>
+        </p:blipFill>
+        <p:spPr>
+          <a:xfrm>
+            <a:off x="1169324" y="2223875"/>
+            <a:ext cx="3340331" cy="4462423"/>
+          </a:xfrm>
+        </p:spPr>
+      </p:pic>
     </p:spTree>
     <p:extLst>
       <p:ext uri="{BB962C8B-B14F-4D97-AF65-F5344CB8AC3E}">

</xml_diff>